<commit_message>
Pdf file of the ppt slides-Ravi
</commit_message>
<xml_diff>
--- a/SLURM_08012018.pptx
+++ b/SLURM_08012018.pptx
@@ -6811,14 +6811,32 @@
                 <a:solidFill>
                   <a:srgbClr val="00FFFF"/>
                 </a:solidFill>
+                <a:hlinkClick r:id="rId2"/>
               </a:rPr>
-              <a:t>https://slurm.schedmd.com/</a:t>
+              <a:t>https://slurm.schedmd.</a:t>
+            </a:r>
+            <a:r>
+              <a:rPr lang="en-US">
+                <a:solidFill>
+                  <a:srgbClr val="00FFFF"/>
+                </a:solidFill>
+                <a:hlinkClick r:id="rId2"/>
+              </a:rPr>
+              <a:t>com/</a:t>
+            </a:r>
+            <a:r>
+              <a:rPr lang="en-US">
+                <a:solidFill>
+                  <a:srgbClr val="00FFFF"/>
+                </a:solidFill>
+              </a:rPr>
+              <a:t> </a:t>
             </a:r>
             <a:endParaRPr lang="en-US" dirty="0">
               <a:solidFill>
                 <a:srgbClr val="00FFFF"/>
               </a:solidFill>
-              <a:hlinkClick r:id="rId2"/>
+              <a:hlinkClick r:id="rId3"/>
             </a:endParaRPr>
           </a:p>
           <a:p>
@@ -6829,7 +6847,7 @@
               <a:solidFill>
                 <a:srgbClr val="00FFFF"/>
               </a:solidFill>
-              <a:hlinkClick r:id="rId2"/>
+              <a:hlinkClick r:id="rId3"/>
             </a:endParaRPr>
           </a:p>
           <a:p>
@@ -6840,7 +6858,7 @@
               <a:solidFill>
                 <a:srgbClr val="00FFFF"/>
               </a:solidFill>
-              <a:hlinkClick r:id="rId2"/>
+              <a:hlinkClick r:id="rId3"/>
             </a:endParaRPr>
           </a:p>
           <a:p>
@@ -6852,14 +6870,15 @@
           <a:p>
             <a:pPr lvl="1"/>
             <a:r>
+              <a:rPr lang="en-US" dirty="0">
+                <a:hlinkClick r:id="rId3"/>
+              </a:rPr>
+              <a:t>https://hpc.nih.gov/docs/pbs2slurm.html</a:t>
+            </a:r>
+            <a:r>
               <a:rPr lang="en-US" dirty="0"/>
-              <a:t>https://hpc.nih.gov/docs/pbs2slurm.</a:t>
-            </a:r>
-            <a:r>
-              <a:rPr lang="en-US"/>
-              <a:t>html </a:t>
-            </a:r>
-            <a:endParaRPr lang="en-US" dirty="0"/>
+              <a:t>  </a:t>
+            </a:r>
           </a:p>
         </p:txBody>
       </p:sp>
@@ -8604,7 +8623,7 @@
         <p:spPr>
           <a:xfrm>
             <a:off x="3361991" y="5792242"/>
-            <a:ext cx="6799234" cy="769441"/>
+            <a:ext cx="6927474" cy="769441"/>
           </a:xfrm>
           <a:prstGeom prst="rect">
             <a:avLst/>
@@ -8621,8 +8640,17 @@
                 <a:solidFill>
                   <a:srgbClr val="00FFFF"/>
                 </a:solidFill>
+                <a:hlinkClick r:id="rId2"/>
               </a:rPr>
               <a:t>https://slurm.schedmd.com/</a:t>
+            </a:r>
+            <a:r>
+              <a:rPr lang="en-US" sz="4400" dirty="0">
+                <a:solidFill>
+                  <a:srgbClr val="00FFFF"/>
+                </a:solidFill>
+              </a:rPr>
+              <a:t> </a:t>
             </a:r>
           </a:p>
         </p:txBody>

</xml_diff>

<commit_message>
link for GitHub repo added-Ravi
</commit_message>
<xml_diff>
--- a/SLURM_08012018.pptx
+++ b/SLURM_08012018.pptx
@@ -7651,6 +7651,61 @@
                 </a:solidFill>
               </a:rPr>
               <a:t>LBR, FNLCR  </a:t>
+            </a:r>
+          </a:p>
+        </p:txBody>
+      </p:sp>
+      <p:sp>
+        <p:nvSpPr>
+          <p:cNvPr id="4" name="Rectangle 3">
+            <a:extLst>
+              <a:ext uri="{FF2B5EF4-FFF2-40B4-BE49-F238E27FC236}">
+                <a16:creationId xmlns:a16="http://schemas.microsoft.com/office/drawing/2014/main" id="{690DB565-B75A-423C-802F-10E9B7415335}"/>
+              </a:ext>
+            </a:extLst>
+          </p:cNvPr>
+          <p:cNvSpPr/>
+          <p:nvPr/>
+        </p:nvSpPr>
+        <p:spPr>
+          <a:xfrm>
+            <a:off x="2252133" y="5257800"/>
+            <a:ext cx="7687734" cy="369332"/>
+          </a:xfrm>
+          <a:prstGeom prst="rect">
+            <a:avLst/>
+          </a:prstGeom>
+          <a:ln>
+            <a:solidFill>
+              <a:schemeClr val="accent4">
+                <a:lumMod val="40000"/>
+                <a:lumOff val="60000"/>
+              </a:schemeClr>
+            </a:solidFill>
+          </a:ln>
+        </p:spPr>
+        <p:txBody>
+          <a:bodyPr wrap="square">
+            <a:spAutoFit/>
+          </a:bodyPr>
+          <a:lstStyle/>
+          <a:p>
+            <a:r>
+              <a:rPr lang="en-US" dirty="0">
+                <a:solidFill>
+                  <a:schemeClr val="bg1"/>
+                </a:solidFill>
+                <a:hlinkClick r:id="rId3"/>
+              </a:rPr>
+              <a:t>https://github.com/FNLCR-Bioinformatics/ProgrammersCorner-Parallelization</a:t>
+            </a:r>
+            <a:r>
+              <a:rPr lang="en-US" dirty="0">
+                <a:solidFill>
+                  <a:schemeClr val="bg1"/>
+                </a:solidFill>
+              </a:rPr>
+              <a:t> </a:t>
             </a:r>
           </a:p>
         </p:txBody>

</xml_diff>